<commit_message>
Sprint-1 -Agregando diseño a menus
</commit_message>
<xml_diff>
--- a/doc/Manual de usuario web Administrador.pptx
+++ b/doc/Manual de usuario web Administrador.pptx
@@ -5,11 +5,15 @@
     <p:sldMasterId id="2147483648" r:id="rId1"/>
   </p:sldMasterIdLst>
   <p:sldIdLst>
-    <p:sldId id="259" r:id="rId2"/>
-    <p:sldId id="260" r:id="rId3"/>
-    <p:sldId id="261" r:id="rId4"/>
-    <p:sldId id="256" r:id="rId5"/>
-    <p:sldId id="258" r:id="rId6"/>
+    <p:sldId id="260" r:id="rId2"/>
+    <p:sldId id="261" r:id="rId3"/>
+    <p:sldId id="256" r:id="rId4"/>
+    <p:sldId id="258" r:id="rId5"/>
+    <p:sldId id="265" r:id="rId6"/>
+    <p:sldId id="262" r:id="rId7"/>
+    <p:sldId id="266" r:id="rId8"/>
+    <p:sldId id="264" r:id="rId9"/>
+    <p:sldId id="267" r:id="rId10"/>
   </p:sldIdLst>
   <p:sldSz cx="12192000" cy="6858000"/>
   <p:notesSz cx="6858000" cy="9144000"/>
@@ -108,6 +112,11 @@
       </a:defRPr>
     </a:lvl9pPr>
   </p:defaultTextStyle>
+  <p:extLst>
+    <p:ext uri="{EFAFB233-063F-42B5-8137-9DF3F51BA10A}">
+      <p15:sldGuideLst xmlns:p15="http://schemas.microsoft.com/office/powerpoint/2012/main"/>
+    </p:ext>
+  </p:extLst>
 </p:presentation>
 </file>
 
@@ -2983,85 +2992,6 @@
           <a:bodyPr/>
           <a:lstStyle/>
           <a:p>
-            <a:r>
-              <a:rPr lang="es-PE" dirty="0" smtClean="0"/>
-              <a:t>Manual de usuario web Administrador</a:t>
-            </a:r>
-            <a:endParaRPr lang="es-PE" dirty="0"/>
-          </a:p>
-        </p:txBody>
-      </p:sp>
-      <p:sp>
-        <p:nvSpPr>
-          <p:cNvPr id="3" name="Marcador de contenido 2"/>
-          <p:cNvSpPr>
-            <a:spLocks noGrp="1"/>
-          </p:cNvSpPr>
-          <p:nvPr>
-            <p:ph idx="1"/>
-          </p:nvPr>
-        </p:nvSpPr>
-        <p:spPr/>
-        <p:txBody>
-          <a:bodyPr/>
-          <a:lstStyle/>
-          <a:p>
-            <a:endParaRPr lang="es-PE" dirty="0"/>
-          </a:p>
-        </p:txBody>
-      </p:sp>
-    </p:spTree>
-    <p:extLst>
-      <p:ext uri="{BB962C8B-B14F-4D97-AF65-F5344CB8AC3E}">
-        <p14:creationId xmlns:p14="http://schemas.microsoft.com/office/powerpoint/2010/main" val="3726462204"/>
-      </p:ext>
-    </p:extLst>
-  </p:cSld>
-  <p:clrMapOvr>
-    <a:masterClrMapping/>
-  </p:clrMapOvr>
-  <p:timing>
-    <p:tnLst>
-      <p:par>
-        <p:cTn id="1" dur="indefinite" restart="never" nodeType="tmRoot"/>
-      </p:par>
-    </p:tnLst>
-  </p:timing>
-</p:sld>
-</file>
-
-<file path=ppt/slides/slide2.xml><?xml version="1.0" encoding="utf-8"?>
-<p:sld xmlns:a="http://schemas.openxmlformats.org/drawingml/2006/main" xmlns:r="http://schemas.openxmlformats.org/officeDocument/2006/relationships" xmlns:p="http://schemas.openxmlformats.org/presentationml/2006/main">
-  <p:cSld>
-    <p:spTree>
-      <p:nvGrpSpPr>
-        <p:cNvPr id="1" name=""/>
-        <p:cNvGrpSpPr/>
-        <p:nvPr/>
-      </p:nvGrpSpPr>
-      <p:grpSpPr>
-        <a:xfrm>
-          <a:off x="0" y="0"/>
-          <a:ext cx="0" cy="0"/>
-          <a:chOff x="0" y="0"/>
-          <a:chExt cx="0" cy="0"/>
-        </a:xfrm>
-      </p:grpSpPr>
-      <p:sp>
-        <p:nvSpPr>
-          <p:cNvPr id="2" name="Título 1"/>
-          <p:cNvSpPr>
-            <a:spLocks noGrp="1"/>
-          </p:cNvSpPr>
-          <p:nvPr>
-            <p:ph type="title"/>
-          </p:nvPr>
-        </p:nvSpPr>
-        <p:spPr/>
-        <p:txBody>
-          <a:bodyPr/>
-          <a:lstStyle/>
-          <a:p>
             <a:endParaRPr lang="es-PE"/>
           </a:p>
         </p:txBody>
@@ -3129,7 +3059,7 @@
 </p:sld>
 </file>
 
-<file path=ppt/slides/slide3.xml><?xml version="1.0" encoding="utf-8"?>
+<file path=ppt/slides/slide2.xml><?xml version="1.0" encoding="utf-8"?>
 <p:sld xmlns:a="http://schemas.openxmlformats.org/drawingml/2006/main" xmlns:r="http://schemas.openxmlformats.org/officeDocument/2006/relationships" xmlns:p="http://schemas.openxmlformats.org/presentationml/2006/main">
   <p:cSld>
     <p:spTree>
@@ -3233,7 +3163,7 @@
 </p:sld>
 </file>
 
-<file path=ppt/slides/slide4.xml><?xml version="1.0" encoding="utf-8"?>
+<file path=ppt/slides/slide3.xml><?xml version="1.0" encoding="utf-8"?>
 <p:sld xmlns:a="http://schemas.openxmlformats.org/drawingml/2006/main" xmlns:r="http://schemas.openxmlformats.org/officeDocument/2006/relationships" xmlns:p="http://schemas.openxmlformats.org/presentationml/2006/main">
   <p:cSld>
     <p:spTree>
@@ -3317,6 +3247,30 @@
           </a:prstGeom>
         </p:spPr>
       </p:pic>
+      <p:pic>
+        <p:nvPicPr>
+          <p:cNvPr id="4" name="Imagen 3"/>
+          <p:cNvPicPr>
+            <a:picLocks noChangeAspect="1"/>
+          </p:cNvPicPr>
+          <p:nvPr/>
+        </p:nvPicPr>
+        <p:blipFill>
+          <a:blip r:embed="rId3"/>
+          <a:stretch>
+            <a:fillRect/>
+          </a:stretch>
+        </p:blipFill>
+        <p:spPr>
+          <a:xfrm>
+            <a:off x="650957" y="4111547"/>
+            <a:ext cx="11140993" cy="1274840"/>
+          </a:xfrm>
+          <a:prstGeom prst="rect">
+            <a:avLst/>
+          </a:prstGeom>
+        </p:spPr>
+      </p:pic>
     </p:spTree>
     <p:extLst>
       <p:ext uri="{BB962C8B-B14F-4D97-AF65-F5344CB8AC3E}">
@@ -3337,7 +3291,7 @@
 </p:sld>
 </file>
 
-<file path=ppt/slides/slide5.xml><?xml version="1.0" encoding="utf-8"?>
+<file path=ppt/slides/slide4.xml><?xml version="1.0" encoding="utf-8"?>
 <p:sld xmlns:a="http://schemas.openxmlformats.org/drawingml/2006/main" xmlns:r="http://schemas.openxmlformats.org/officeDocument/2006/relationships" xmlns:p="http://schemas.openxmlformats.org/presentationml/2006/main">
   <p:cSld>
     <p:spTree>
@@ -3383,6 +3337,30 @@
           </a:prstGeom>
         </p:spPr>
       </p:pic>
+      <p:pic>
+        <p:nvPicPr>
+          <p:cNvPr id="3" name="Imagen 2"/>
+          <p:cNvPicPr>
+            <a:picLocks noChangeAspect="1"/>
+          </p:cNvPicPr>
+          <p:nvPr/>
+        </p:nvPicPr>
+        <p:blipFill>
+          <a:blip r:embed="rId3"/>
+          <a:stretch>
+            <a:fillRect/>
+          </a:stretch>
+        </p:blipFill>
+        <p:spPr>
+          <a:xfrm>
+            <a:off x="1638300" y="3619500"/>
+            <a:ext cx="9307378" cy="1352550"/>
+          </a:xfrm>
+          <a:prstGeom prst="rect">
+            <a:avLst/>
+          </a:prstGeom>
+        </p:spPr>
+      </p:pic>
     </p:spTree>
     <p:extLst>
       <p:ext uri="{BB962C8B-B14F-4D97-AF65-F5344CB8AC3E}">
@@ -3400,6 +3378,436 @@
       </p:par>
     </p:tnLst>
   </p:timing>
+</p:sld>
+</file>
+
+<file path=ppt/slides/slide5.xml><?xml version="1.0" encoding="utf-8"?>
+<p:sld xmlns:a="http://schemas.openxmlformats.org/drawingml/2006/main" xmlns:r="http://schemas.openxmlformats.org/officeDocument/2006/relationships" xmlns:p="http://schemas.openxmlformats.org/presentationml/2006/main">
+  <p:cSld>
+    <p:spTree>
+      <p:nvGrpSpPr>
+        <p:cNvPr id="1" name=""/>
+        <p:cNvGrpSpPr/>
+        <p:nvPr/>
+      </p:nvGrpSpPr>
+      <p:grpSpPr>
+        <a:xfrm>
+          <a:off x="0" y="0"/>
+          <a:ext cx="0" cy="0"/>
+          <a:chOff x="0" y="0"/>
+          <a:chExt cx="0" cy="0"/>
+        </a:xfrm>
+      </p:grpSpPr>
+      <p:pic>
+        <p:nvPicPr>
+          <p:cNvPr id="5" name="Imagen 4"/>
+          <p:cNvPicPr>
+            <a:picLocks noChangeAspect="1"/>
+          </p:cNvPicPr>
+          <p:nvPr/>
+        </p:nvPicPr>
+        <p:blipFill>
+          <a:blip r:embed="rId2"/>
+          <a:stretch>
+            <a:fillRect/>
+          </a:stretch>
+        </p:blipFill>
+        <p:spPr>
+          <a:xfrm>
+            <a:off x="-288324" y="-248371"/>
+            <a:ext cx="12632724" cy="7276450"/>
+          </a:xfrm>
+          <a:prstGeom prst="rect">
+            <a:avLst/>
+          </a:prstGeom>
+        </p:spPr>
+      </p:pic>
+      <p:pic>
+        <p:nvPicPr>
+          <p:cNvPr id="6" name="Imagen 5"/>
+          <p:cNvPicPr>
+            <a:picLocks noChangeAspect="1"/>
+          </p:cNvPicPr>
+          <p:nvPr/>
+        </p:nvPicPr>
+        <p:blipFill rotWithShape="1">
+          <a:blip r:embed="rId3"/>
+          <a:srcRect r="35975"/>
+          <a:stretch/>
+        </p:blipFill>
+        <p:spPr>
+          <a:xfrm>
+            <a:off x="1483326" y="1239801"/>
+            <a:ext cx="8994174" cy="3406438"/>
+          </a:xfrm>
+          <a:prstGeom prst="rect">
+            <a:avLst/>
+          </a:prstGeom>
+        </p:spPr>
+      </p:pic>
+      <p:pic>
+        <p:nvPicPr>
+          <p:cNvPr id="7" name="Imagen 6"/>
+          <p:cNvPicPr>
+            <a:picLocks noChangeAspect="1"/>
+          </p:cNvPicPr>
+          <p:nvPr/>
+        </p:nvPicPr>
+        <p:blipFill rotWithShape="1">
+          <a:blip r:embed="rId4"/>
+          <a:srcRect t="25897" b="40974"/>
+          <a:stretch/>
+        </p:blipFill>
+        <p:spPr>
+          <a:xfrm>
+            <a:off x="4133850" y="3523204"/>
+            <a:ext cx="4457700" cy="723900"/>
+          </a:xfrm>
+          <a:prstGeom prst="rect">
+            <a:avLst/>
+          </a:prstGeom>
+        </p:spPr>
+      </p:pic>
+    </p:spTree>
+    <p:extLst>
+      <p:ext uri="{BB962C8B-B14F-4D97-AF65-F5344CB8AC3E}">
+        <p14:creationId xmlns:p14="http://schemas.microsoft.com/office/powerpoint/2010/main" val="2671844825"/>
+      </p:ext>
+    </p:extLst>
+  </p:cSld>
+  <p:clrMapOvr>
+    <a:masterClrMapping/>
+  </p:clrMapOvr>
+  <p:timing>
+    <p:tnLst>
+      <p:par>
+        <p:cTn id="1" dur="indefinite" restart="never" nodeType="tmRoot"/>
+      </p:par>
+    </p:tnLst>
+  </p:timing>
+</p:sld>
+</file>
+
+<file path=ppt/slides/slide6.xml><?xml version="1.0" encoding="utf-8"?>
+<p:sld xmlns:a="http://schemas.openxmlformats.org/drawingml/2006/main" xmlns:r="http://schemas.openxmlformats.org/officeDocument/2006/relationships" xmlns:p="http://schemas.openxmlformats.org/presentationml/2006/main">
+  <p:cSld>
+    <p:spTree>
+      <p:nvGrpSpPr>
+        <p:cNvPr id="1" name=""/>
+        <p:cNvGrpSpPr/>
+        <p:nvPr/>
+      </p:nvGrpSpPr>
+      <p:grpSpPr>
+        <a:xfrm>
+          <a:off x="0" y="0"/>
+          <a:ext cx="0" cy="0"/>
+          <a:chOff x="0" y="0"/>
+          <a:chExt cx="0" cy="0"/>
+        </a:xfrm>
+      </p:grpSpPr>
+      <p:pic>
+        <p:nvPicPr>
+          <p:cNvPr id="4" name="Imagen 3"/>
+          <p:cNvPicPr>
+            <a:picLocks noChangeAspect="1"/>
+          </p:cNvPicPr>
+          <p:nvPr/>
+        </p:nvPicPr>
+        <p:blipFill>
+          <a:blip r:embed="rId2"/>
+          <a:stretch>
+            <a:fillRect/>
+          </a:stretch>
+        </p:blipFill>
+        <p:spPr>
+          <a:xfrm>
+            <a:off x="-288324" y="-248371"/>
+            <a:ext cx="12632724" cy="7276450"/>
+          </a:xfrm>
+          <a:prstGeom prst="rect">
+            <a:avLst/>
+          </a:prstGeom>
+        </p:spPr>
+      </p:pic>
+      <p:pic>
+        <p:nvPicPr>
+          <p:cNvPr id="7" name="Imagen 6"/>
+          <p:cNvPicPr>
+            <a:picLocks noChangeAspect="1"/>
+          </p:cNvPicPr>
+          <p:nvPr/>
+        </p:nvPicPr>
+        <p:blipFill>
+          <a:blip r:embed="rId3"/>
+          <a:stretch>
+            <a:fillRect/>
+          </a:stretch>
+        </p:blipFill>
+        <p:spPr>
+          <a:xfrm>
+            <a:off x="1524000" y="95250"/>
+            <a:ext cx="9131968" cy="6858000"/>
+          </a:xfrm>
+          <a:prstGeom prst="rect">
+            <a:avLst/>
+          </a:prstGeom>
+        </p:spPr>
+      </p:pic>
+    </p:spTree>
+    <p:extLst>
+      <p:ext uri="{BB962C8B-B14F-4D97-AF65-F5344CB8AC3E}">
+        <p14:creationId xmlns:p14="http://schemas.microsoft.com/office/powerpoint/2010/main" val="3357947320"/>
+      </p:ext>
+    </p:extLst>
+  </p:cSld>
+  <p:clrMapOvr>
+    <a:masterClrMapping/>
+  </p:clrMapOvr>
+  <p:timing>
+    <p:tnLst>
+      <p:par>
+        <p:cTn id="1" dur="indefinite" restart="never" nodeType="tmRoot"/>
+      </p:par>
+    </p:tnLst>
+  </p:timing>
+</p:sld>
+</file>
+
+<file path=ppt/slides/slide7.xml><?xml version="1.0" encoding="utf-8"?>
+<p:sld xmlns:a="http://schemas.openxmlformats.org/drawingml/2006/main" xmlns:r="http://schemas.openxmlformats.org/officeDocument/2006/relationships" xmlns:p="http://schemas.openxmlformats.org/presentationml/2006/main">
+  <p:cSld>
+    <p:spTree>
+      <p:nvGrpSpPr>
+        <p:cNvPr id="1" name=""/>
+        <p:cNvGrpSpPr/>
+        <p:nvPr/>
+      </p:nvGrpSpPr>
+      <p:grpSpPr>
+        <a:xfrm>
+          <a:off x="0" y="0"/>
+          <a:ext cx="0" cy="0"/>
+          <a:chOff x="0" y="0"/>
+          <a:chExt cx="0" cy="0"/>
+        </a:xfrm>
+      </p:grpSpPr>
+      <p:pic>
+        <p:nvPicPr>
+          <p:cNvPr id="5" name="Imagen 4"/>
+          <p:cNvPicPr>
+            <a:picLocks noChangeAspect="1"/>
+          </p:cNvPicPr>
+          <p:nvPr/>
+        </p:nvPicPr>
+        <p:blipFill>
+          <a:blip r:embed="rId2"/>
+          <a:stretch>
+            <a:fillRect/>
+          </a:stretch>
+        </p:blipFill>
+        <p:spPr>
+          <a:xfrm>
+            <a:off x="-288324" y="-248371"/>
+            <a:ext cx="12632724" cy="7276450"/>
+          </a:xfrm>
+          <a:prstGeom prst="rect">
+            <a:avLst/>
+          </a:prstGeom>
+        </p:spPr>
+      </p:pic>
+      <p:pic>
+        <p:nvPicPr>
+          <p:cNvPr id="2" name="Imagen 1"/>
+          <p:cNvPicPr>
+            <a:picLocks noChangeAspect="1"/>
+          </p:cNvPicPr>
+          <p:nvPr/>
+        </p:nvPicPr>
+        <p:blipFill>
+          <a:blip r:embed="rId3"/>
+          <a:stretch>
+            <a:fillRect/>
+          </a:stretch>
+        </p:blipFill>
+        <p:spPr>
+          <a:xfrm>
+            <a:off x="-58700" y="1537062"/>
+            <a:ext cx="12173476" cy="3705584"/>
+          </a:xfrm>
+          <a:prstGeom prst="rect">
+            <a:avLst/>
+          </a:prstGeom>
+        </p:spPr>
+      </p:pic>
+    </p:spTree>
+    <p:extLst>
+      <p:ext uri="{BB962C8B-B14F-4D97-AF65-F5344CB8AC3E}">
+        <p14:creationId xmlns:p14="http://schemas.microsoft.com/office/powerpoint/2010/main" val="3149045590"/>
+      </p:ext>
+    </p:extLst>
+  </p:cSld>
+  <p:clrMapOvr>
+    <a:masterClrMapping/>
+  </p:clrMapOvr>
+  <p:timing>
+    <p:tnLst>
+      <p:par>
+        <p:cTn id="1" dur="indefinite" restart="never" nodeType="tmRoot"/>
+      </p:par>
+    </p:tnLst>
+  </p:timing>
+</p:sld>
+</file>
+
+<file path=ppt/slides/slide8.xml><?xml version="1.0" encoding="utf-8"?>
+<p:sld xmlns:a="http://schemas.openxmlformats.org/drawingml/2006/main" xmlns:r="http://schemas.openxmlformats.org/officeDocument/2006/relationships" xmlns:p="http://schemas.openxmlformats.org/presentationml/2006/main">
+  <p:cSld>
+    <p:spTree>
+      <p:nvGrpSpPr>
+        <p:cNvPr id="1" name=""/>
+        <p:cNvGrpSpPr/>
+        <p:nvPr/>
+      </p:nvGrpSpPr>
+      <p:grpSpPr>
+        <a:xfrm>
+          <a:off x="0" y="0"/>
+          <a:ext cx="0" cy="0"/>
+          <a:chOff x="0" y="0"/>
+          <a:chExt cx="0" cy="0"/>
+        </a:xfrm>
+      </p:grpSpPr>
+      <p:pic>
+        <p:nvPicPr>
+          <p:cNvPr id="4" name="Imagen 3"/>
+          <p:cNvPicPr>
+            <a:picLocks noChangeAspect="1"/>
+          </p:cNvPicPr>
+          <p:nvPr/>
+        </p:nvPicPr>
+        <p:blipFill>
+          <a:blip r:embed="rId2"/>
+          <a:stretch>
+            <a:fillRect/>
+          </a:stretch>
+        </p:blipFill>
+        <p:spPr>
+          <a:xfrm>
+            <a:off x="-288324" y="-248371"/>
+            <a:ext cx="12632724" cy="7276450"/>
+          </a:xfrm>
+          <a:prstGeom prst="rect">
+            <a:avLst/>
+          </a:prstGeom>
+        </p:spPr>
+      </p:pic>
+      <p:pic>
+        <p:nvPicPr>
+          <p:cNvPr id="3" name="Imagen 2"/>
+          <p:cNvPicPr>
+            <a:picLocks noChangeAspect="1"/>
+          </p:cNvPicPr>
+          <p:nvPr/>
+        </p:nvPicPr>
+        <p:blipFill>
+          <a:blip r:embed="rId3"/>
+          <a:stretch>
+            <a:fillRect/>
+          </a:stretch>
+        </p:blipFill>
+        <p:spPr>
+          <a:xfrm>
+            <a:off x="1685925" y="127541"/>
+            <a:ext cx="8381200" cy="6600825"/>
+          </a:xfrm>
+          <a:prstGeom prst="rect">
+            <a:avLst/>
+          </a:prstGeom>
+        </p:spPr>
+      </p:pic>
+    </p:spTree>
+    <p:extLst>
+      <p:ext uri="{BB962C8B-B14F-4D97-AF65-F5344CB8AC3E}">
+        <p14:creationId xmlns:p14="http://schemas.microsoft.com/office/powerpoint/2010/main" val="3976936273"/>
+      </p:ext>
+    </p:extLst>
+  </p:cSld>
+  <p:clrMapOvr>
+    <a:masterClrMapping/>
+  </p:clrMapOvr>
+  <p:timing>
+    <p:tnLst>
+      <p:par>
+        <p:cTn id="1" dur="indefinite" restart="never" nodeType="tmRoot"/>
+      </p:par>
+    </p:tnLst>
+  </p:timing>
+</p:sld>
+</file>
+
+<file path=ppt/slides/slide9.xml><?xml version="1.0" encoding="utf-8"?>
+<p:sld xmlns:a="http://schemas.openxmlformats.org/drawingml/2006/main" xmlns:r="http://schemas.openxmlformats.org/officeDocument/2006/relationships" xmlns:p="http://schemas.openxmlformats.org/presentationml/2006/main">
+  <p:cSld>
+    <p:spTree>
+      <p:nvGrpSpPr>
+        <p:cNvPr id="1" name=""/>
+        <p:cNvGrpSpPr/>
+        <p:nvPr/>
+      </p:nvGrpSpPr>
+      <p:grpSpPr>
+        <a:xfrm>
+          <a:off x="0" y="0"/>
+          <a:ext cx="0" cy="0"/>
+          <a:chOff x="0" y="0"/>
+          <a:chExt cx="0" cy="0"/>
+        </a:xfrm>
+      </p:grpSpPr>
+      <p:sp>
+        <p:nvSpPr>
+          <p:cNvPr id="2" name="Título 1"/>
+          <p:cNvSpPr>
+            <a:spLocks noGrp="1"/>
+          </p:cNvSpPr>
+          <p:nvPr>
+            <p:ph type="title"/>
+          </p:nvPr>
+        </p:nvSpPr>
+        <p:spPr/>
+        <p:txBody>
+          <a:bodyPr/>
+          <a:lstStyle/>
+          <a:p>
+            <a:endParaRPr lang="es-PE"/>
+          </a:p>
+        </p:txBody>
+      </p:sp>
+      <p:sp>
+        <p:nvSpPr>
+          <p:cNvPr id="3" name="Marcador de contenido 2"/>
+          <p:cNvSpPr>
+            <a:spLocks noGrp="1"/>
+          </p:cNvSpPr>
+          <p:nvPr>
+            <p:ph idx="1"/>
+          </p:nvPr>
+        </p:nvSpPr>
+        <p:spPr/>
+        <p:txBody>
+          <a:bodyPr/>
+          <a:lstStyle/>
+          <a:p>
+            <a:endParaRPr lang="es-PE"/>
+          </a:p>
+        </p:txBody>
+      </p:sp>
+    </p:spTree>
+    <p:extLst>
+      <p:ext uri="{BB962C8B-B14F-4D97-AF65-F5344CB8AC3E}">
+        <p14:creationId xmlns:p14="http://schemas.microsoft.com/office/powerpoint/2010/main" val="3913869619"/>
+      </p:ext>
+    </p:extLst>
+  </p:cSld>
+  <p:clrMapOvr>
+    <a:masterClrMapping/>
+  </p:clrMapOvr>
 </p:sld>
 </file>
 

</xml_diff>